<commit_message>
interim checkin, working on ability to generate a single form for an entire base with simple hex top.
</commit_message>
<xml_diff>
--- a/28mm/gloomhaven/refinement.pptx
+++ b/28mm/gloomhaven/refinement.pptx
@@ -7,6 +7,7 @@
   <p:sldIdLst>
     <p:sldId id="256" r:id="rId2"/>
     <p:sldId id="257" r:id="rId3"/>
+    <p:sldId id="258" r:id="rId4"/>
   </p:sldIdLst>
   <p:sldSz cx="12192000" cy="6858000"/>
   <p:notesSz cx="6858000" cy="9144000"/>
@@ -260,7 +261,7 @@
           <a:p>
             <a:fld id="{66652390-E54C-6B43-A573-AA0AEE588A34}" type="datetimeFigureOut">
               <a:rPr lang="en-US" smtClean="0"/>
-              <a:t>4/25/18</a:t>
+              <a:t>4/27/18</a:t>
             </a:fld>
             <a:endParaRPr lang="en-US"/>
           </a:p>
@@ -458,7 +459,7 @@
           <a:p>
             <a:fld id="{66652390-E54C-6B43-A573-AA0AEE588A34}" type="datetimeFigureOut">
               <a:rPr lang="en-US" smtClean="0"/>
-              <a:t>4/25/18</a:t>
+              <a:t>4/27/18</a:t>
             </a:fld>
             <a:endParaRPr lang="en-US"/>
           </a:p>
@@ -666,7 +667,7 @@
           <a:p>
             <a:fld id="{66652390-E54C-6B43-A573-AA0AEE588A34}" type="datetimeFigureOut">
               <a:rPr lang="en-US" smtClean="0"/>
-              <a:t>4/25/18</a:t>
+              <a:t>4/27/18</a:t>
             </a:fld>
             <a:endParaRPr lang="en-US"/>
           </a:p>
@@ -864,7 +865,7 @@
           <a:p>
             <a:fld id="{66652390-E54C-6B43-A573-AA0AEE588A34}" type="datetimeFigureOut">
               <a:rPr lang="en-US" smtClean="0"/>
-              <a:t>4/25/18</a:t>
+              <a:t>4/27/18</a:t>
             </a:fld>
             <a:endParaRPr lang="en-US"/>
           </a:p>
@@ -1139,7 +1140,7 @@
           <a:p>
             <a:fld id="{66652390-E54C-6B43-A573-AA0AEE588A34}" type="datetimeFigureOut">
               <a:rPr lang="en-US" smtClean="0"/>
-              <a:t>4/25/18</a:t>
+              <a:t>4/27/18</a:t>
             </a:fld>
             <a:endParaRPr lang="en-US"/>
           </a:p>
@@ -1404,7 +1405,7 @@
           <a:p>
             <a:fld id="{66652390-E54C-6B43-A573-AA0AEE588A34}" type="datetimeFigureOut">
               <a:rPr lang="en-US" smtClean="0"/>
-              <a:t>4/25/18</a:t>
+              <a:t>4/27/18</a:t>
             </a:fld>
             <a:endParaRPr lang="en-US"/>
           </a:p>
@@ -1816,7 +1817,7 @@
           <a:p>
             <a:fld id="{66652390-E54C-6B43-A573-AA0AEE588A34}" type="datetimeFigureOut">
               <a:rPr lang="en-US" smtClean="0"/>
-              <a:t>4/25/18</a:t>
+              <a:t>4/27/18</a:t>
             </a:fld>
             <a:endParaRPr lang="en-US"/>
           </a:p>
@@ -1957,7 +1958,7 @@
           <a:p>
             <a:fld id="{66652390-E54C-6B43-A573-AA0AEE588A34}" type="datetimeFigureOut">
               <a:rPr lang="en-US" smtClean="0"/>
-              <a:t>4/25/18</a:t>
+              <a:t>4/27/18</a:t>
             </a:fld>
             <a:endParaRPr lang="en-US"/>
           </a:p>
@@ -2070,7 +2071,7 @@
           <a:p>
             <a:fld id="{66652390-E54C-6B43-A573-AA0AEE588A34}" type="datetimeFigureOut">
               <a:rPr lang="en-US" smtClean="0"/>
-              <a:t>4/25/18</a:t>
+              <a:t>4/27/18</a:t>
             </a:fld>
             <a:endParaRPr lang="en-US"/>
           </a:p>
@@ -2381,7 +2382,7 @@
           <a:p>
             <a:fld id="{66652390-E54C-6B43-A573-AA0AEE588A34}" type="datetimeFigureOut">
               <a:rPr lang="en-US" smtClean="0"/>
-              <a:t>4/25/18</a:t>
+              <a:t>4/27/18</a:t>
             </a:fld>
             <a:endParaRPr lang="en-US"/>
           </a:p>
@@ -2669,7 +2670,7 @@
           <a:p>
             <a:fld id="{66652390-E54C-6B43-A573-AA0AEE588A34}" type="datetimeFigureOut">
               <a:rPr lang="en-US" smtClean="0"/>
-              <a:t>4/25/18</a:t>
+              <a:t>4/27/18</a:t>
             </a:fld>
             <a:endParaRPr lang="en-US"/>
           </a:p>
@@ -2910,7 +2911,7 @@
           <a:p>
             <a:fld id="{66652390-E54C-6B43-A573-AA0AEE588A34}" type="datetimeFigureOut">
               <a:rPr lang="en-US" smtClean="0"/>
-              <a:t>4/25/18</a:t>
+              <a:t>4/27/18</a:t>
             </a:fld>
             <a:endParaRPr lang="en-US"/>
           </a:p>
@@ -8819,10 +8820,987 @@
           </a:p>
         </p:txBody>
       </p:sp>
+      <p:sp>
+        <p:nvSpPr>
+          <p:cNvPr id="42" name="Hexagon 41">
+            <a:extLst>
+              <a:ext uri="{FF2B5EF4-FFF2-40B4-BE49-F238E27FC236}">
+                <a16:creationId xmlns:a16="http://schemas.microsoft.com/office/drawing/2014/main" id="{32E93C28-4696-3B4A-91EB-EA1128813313}"/>
+              </a:ext>
+            </a:extLst>
+          </p:cNvPr>
+          <p:cNvSpPr/>
+          <p:nvPr/>
+        </p:nvSpPr>
+        <p:spPr>
+          <a:xfrm>
+            <a:off x="5446643" y="4757530"/>
+            <a:ext cx="622853" cy="556592"/>
+          </a:xfrm>
+          <a:prstGeom prst="hexagon">
+            <a:avLst/>
+          </a:prstGeom>
+        </p:spPr>
+        <p:style>
+          <a:lnRef idx="2">
+            <a:schemeClr val="accent1">
+              <a:shade val="50000"/>
+            </a:schemeClr>
+          </a:lnRef>
+          <a:fillRef idx="1">
+            <a:schemeClr val="accent1"/>
+          </a:fillRef>
+          <a:effectRef idx="0">
+            <a:schemeClr val="accent1"/>
+          </a:effectRef>
+          <a:fontRef idx="minor">
+            <a:schemeClr val="lt1"/>
+          </a:fontRef>
+        </p:style>
+        <p:txBody>
+          <a:bodyPr rtlCol="0" anchor="ctr"/>
+          <a:lstStyle/>
+          <a:p>
+            <a:pPr algn="ctr"/>
+            <a:endParaRPr lang="en-US"/>
+          </a:p>
+        </p:txBody>
+      </p:sp>
     </p:spTree>
     <p:extLst>
       <p:ext uri="{BB962C8B-B14F-4D97-AF65-F5344CB8AC3E}">
         <p14:creationId xmlns:p14="http://schemas.microsoft.com/office/powerpoint/2010/main" val="1913685509"/>
+      </p:ext>
+    </p:extLst>
+  </p:cSld>
+  <p:clrMapOvr>
+    <a:masterClrMapping/>
+  </p:clrMapOvr>
+</p:sld>
+</file>
+
+<file path=ppt/slides/slide3.xml><?xml version="1.0" encoding="utf-8"?>
+<p:sld xmlns:a="http://schemas.openxmlformats.org/drawingml/2006/main" xmlns:r="http://schemas.openxmlformats.org/officeDocument/2006/relationships" xmlns:p="http://schemas.openxmlformats.org/presentationml/2006/main">
+  <p:cSld>
+    <p:spTree>
+      <p:nvGrpSpPr>
+        <p:cNvPr id="1" name=""/>
+        <p:cNvGrpSpPr/>
+        <p:nvPr/>
+      </p:nvGrpSpPr>
+      <p:grpSpPr>
+        <a:xfrm>
+          <a:off x="0" y="0"/>
+          <a:ext cx="0" cy="0"/>
+          <a:chOff x="0" y="0"/>
+          <a:chExt cx="0" cy="0"/>
+        </a:xfrm>
+      </p:grpSpPr>
+      <p:grpSp>
+        <p:nvGrpSpPr>
+          <p:cNvPr id="17" name="Group 16">
+            <a:extLst>
+              <a:ext uri="{FF2B5EF4-FFF2-40B4-BE49-F238E27FC236}">
+                <a16:creationId xmlns:a16="http://schemas.microsoft.com/office/drawing/2014/main" id="{3E61FC5E-D1A9-5942-A28F-782E045CF92F}"/>
+              </a:ext>
+            </a:extLst>
+          </p:cNvPr>
+          <p:cNvGrpSpPr/>
+          <p:nvPr/>
+        </p:nvGrpSpPr>
+        <p:grpSpPr>
+          <a:xfrm>
+            <a:off x="586407" y="490329"/>
+            <a:ext cx="2178331" cy="2378767"/>
+            <a:chOff x="3409120" y="1139685"/>
+            <a:chExt cx="2178331" cy="2378767"/>
+          </a:xfrm>
+        </p:grpSpPr>
+        <p:sp>
+          <p:nvSpPr>
+            <p:cNvPr id="3" name="Hexagon 2">
+              <a:extLst>
+                <a:ext uri="{FF2B5EF4-FFF2-40B4-BE49-F238E27FC236}">
+                  <a16:creationId xmlns:a16="http://schemas.microsoft.com/office/drawing/2014/main" id="{A78545ED-C1C0-114E-9617-3F62E8737EE9}"/>
+                </a:ext>
+              </a:extLst>
+            </p:cNvPr>
+            <p:cNvSpPr/>
+            <p:nvPr/>
+          </p:nvSpPr>
+          <p:spPr>
+            <a:xfrm>
+              <a:off x="4439478" y="2928730"/>
+              <a:ext cx="622853" cy="556592"/>
+            </a:xfrm>
+            <a:prstGeom prst="hexagon">
+              <a:avLst/>
+            </a:prstGeom>
+          </p:spPr>
+          <p:style>
+            <a:lnRef idx="2">
+              <a:schemeClr val="accent1">
+                <a:shade val="50000"/>
+              </a:schemeClr>
+            </a:lnRef>
+            <a:fillRef idx="1">
+              <a:schemeClr val="accent1"/>
+            </a:fillRef>
+            <a:effectRef idx="0">
+              <a:schemeClr val="accent1"/>
+            </a:effectRef>
+            <a:fontRef idx="minor">
+              <a:schemeClr val="lt1"/>
+            </a:fontRef>
+          </p:style>
+          <p:txBody>
+            <a:bodyPr rtlCol="0" anchor="ctr"/>
+            <a:lstStyle/>
+            <a:p>
+              <a:pPr algn="ctr"/>
+              <a:endParaRPr lang="en-US"/>
+            </a:p>
+          </p:txBody>
+        </p:sp>
+        <p:sp>
+          <p:nvSpPr>
+            <p:cNvPr id="4" name="Hexagon 3">
+              <a:extLst>
+                <a:ext uri="{FF2B5EF4-FFF2-40B4-BE49-F238E27FC236}">
+                  <a16:creationId xmlns:a16="http://schemas.microsoft.com/office/drawing/2014/main" id="{2B1BD550-63AF-5847-8B22-F53327182EE4}"/>
+                </a:ext>
+              </a:extLst>
+            </p:cNvPr>
+            <p:cNvSpPr/>
+            <p:nvPr/>
+          </p:nvSpPr>
+          <p:spPr>
+            <a:xfrm>
+              <a:off x="3929269" y="2650434"/>
+              <a:ext cx="622853" cy="556592"/>
+            </a:xfrm>
+            <a:prstGeom prst="hexagon">
+              <a:avLst/>
+            </a:prstGeom>
+          </p:spPr>
+          <p:style>
+            <a:lnRef idx="2">
+              <a:schemeClr val="accent1">
+                <a:shade val="50000"/>
+              </a:schemeClr>
+            </a:lnRef>
+            <a:fillRef idx="1">
+              <a:schemeClr val="accent1"/>
+            </a:fillRef>
+            <a:effectRef idx="0">
+              <a:schemeClr val="accent1"/>
+            </a:effectRef>
+            <a:fontRef idx="minor">
+              <a:schemeClr val="lt1"/>
+            </a:fontRef>
+          </p:style>
+          <p:txBody>
+            <a:bodyPr rtlCol="0" anchor="ctr"/>
+            <a:lstStyle/>
+            <a:p>
+              <a:pPr algn="ctr"/>
+              <a:endParaRPr lang="en-US"/>
+            </a:p>
+          </p:txBody>
+        </p:sp>
+        <p:sp>
+          <p:nvSpPr>
+            <p:cNvPr id="5" name="Hexagon 4">
+              <a:extLst>
+                <a:ext uri="{FF2B5EF4-FFF2-40B4-BE49-F238E27FC236}">
+                  <a16:creationId xmlns:a16="http://schemas.microsoft.com/office/drawing/2014/main" id="{2BF6575B-506F-C446-9CCB-624FA704E815}"/>
+                </a:ext>
+              </a:extLst>
+            </p:cNvPr>
+            <p:cNvSpPr/>
+            <p:nvPr/>
+          </p:nvSpPr>
+          <p:spPr>
+            <a:xfrm>
+              <a:off x="4439478" y="2345633"/>
+              <a:ext cx="622853" cy="556592"/>
+            </a:xfrm>
+            <a:prstGeom prst="hexagon">
+              <a:avLst/>
+            </a:prstGeom>
+          </p:spPr>
+          <p:style>
+            <a:lnRef idx="2">
+              <a:schemeClr val="accent1">
+                <a:shade val="50000"/>
+              </a:schemeClr>
+            </a:lnRef>
+            <a:fillRef idx="1">
+              <a:schemeClr val="accent1"/>
+            </a:fillRef>
+            <a:effectRef idx="0">
+              <a:schemeClr val="accent1"/>
+            </a:effectRef>
+            <a:fontRef idx="minor">
+              <a:schemeClr val="lt1"/>
+            </a:fontRef>
+          </p:style>
+          <p:txBody>
+            <a:bodyPr rtlCol="0" anchor="ctr"/>
+            <a:lstStyle/>
+            <a:p>
+              <a:pPr algn="ctr"/>
+              <a:endParaRPr lang="en-US"/>
+            </a:p>
+          </p:txBody>
+        </p:sp>
+        <p:sp>
+          <p:nvSpPr>
+            <p:cNvPr id="6" name="Hexagon 5">
+              <a:extLst>
+                <a:ext uri="{FF2B5EF4-FFF2-40B4-BE49-F238E27FC236}">
+                  <a16:creationId xmlns:a16="http://schemas.microsoft.com/office/drawing/2014/main" id="{DA16CA34-8926-CE4F-80F8-A5A25A4146D9}"/>
+                </a:ext>
+              </a:extLst>
+            </p:cNvPr>
+            <p:cNvSpPr/>
+            <p:nvPr/>
+          </p:nvSpPr>
+          <p:spPr>
+            <a:xfrm>
+              <a:off x="3419060" y="2961860"/>
+              <a:ext cx="622853" cy="556592"/>
+            </a:xfrm>
+            <a:prstGeom prst="hexagon">
+              <a:avLst/>
+            </a:prstGeom>
+          </p:spPr>
+          <p:style>
+            <a:lnRef idx="2">
+              <a:schemeClr val="accent1">
+                <a:shade val="50000"/>
+              </a:schemeClr>
+            </a:lnRef>
+            <a:fillRef idx="1">
+              <a:schemeClr val="accent1"/>
+            </a:fillRef>
+            <a:effectRef idx="0">
+              <a:schemeClr val="accent1"/>
+            </a:effectRef>
+            <a:fontRef idx="minor">
+              <a:schemeClr val="lt1"/>
+            </a:fontRef>
+          </p:style>
+          <p:txBody>
+            <a:bodyPr rtlCol="0" anchor="ctr"/>
+            <a:lstStyle/>
+            <a:p>
+              <a:pPr algn="ctr"/>
+              <a:endParaRPr lang="en-US"/>
+            </a:p>
+          </p:txBody>
+        </p:sp>
+        <p:sp>
+          <p:nvSpPr>
+            <p:cNvPr id="7" name="Hexagon 6">
+              <a:extLst>
+                <a:ext uri="{FF2B5EF4-FFF2-40B4-BE49-F238E27FC236}">
+                  <a16:creationId xmlns:a16="http://schemas.microsoft.com/office/drawing/2014/main" id="{23661576-F37B-4A4C-BAD4-628DC826675D}"/>
+                </a:ext>
+              </a:extLst>
+            </p:cNvPr>
+            <p:cNvSpPr/>
+            <p:nvPr/>
+          </p:nvSpPr>
+          <p:spPr>
+            <a:xfrm>
+              <a:off x="4949687" y="2054085"/>
+              <a:ext cx="622853" cy="556592"/>
+            </a:xfrm>
+            <a:prstGeom prst="hexagon">
+              <a:avLst/>
+            </a:prstGeom>
+          </p:spPr>
+          <p:style>
+            <a:lnRef idx="2">
+              <a:schemeClr val="accent1">
+                <a:shade val="50000"/>
+              </a:schemeClr>
+            </a:lnRef>
+            <a:fillRef idx="1">
+              <a:schemeClr val="accent1"/>
+            </a:fillRef>
+            <a:effectRef idx="0">
+              <a:schemeClr val="accent1"/>
+            </a:effectRef>
+            <a:fontRef idx="minor">
+              <a:schemeClr val="lt1"/>
+            </a:fontRef>
+          </p:style>
+          <p:txBody>
+            <a:bodyPr rtlCol="0" anchor="ctr"/>
+            <a:lstStyle/>
+            <a:p>
+              <a:pPr algn="ctr"/>
+              <a:endParaRPr lang="en-US"/>
+            </a:p>
+          </p:txBody>
+        </p:sp>
+        <p:sp>
+          <p:nvSpPr>
+            <p:cNvPr id="8" name="Hexagon 7">
+              <a:extLst>
+                <a:ext uri="{FF2B5EF4-FFF2-40B4-BE49-F238E27FC236}">
+                  <a16:creationId xmlns:a16="http://schemas.microsoft.com/office/drawing/2014/main" id="{22ED2044-C163-F744-A561-F79135CEDF83}"/>
+                </a:ext>
+              </a:extLst>
+            </p:cNvPr>
+            <p:cNvSpPr/>
+            <p:nvPr/>
+          </p:nvSpPr>
+          <p:spPr>
+            <a:xfrm>
+              <a:off x="3929269" y="2054085"/>
+              <a:ext cx="622853" cy="556592"/>
+            </a:xfrm>
+            <a:prstGeom prst="hexagon">
+              <a:avLst/>
+            </a:prstGeom>
+          </p:spPr>
+          <p:style>
+            <a:lnRef idx="2">
+              <a:schemeClr val="accent1">
+                <a:shade val="50000"/>
+              </a:schemeClr>
+            </a:lnRef>
+            <a:fillRef idx="1">
+              <a:schemeClr val="accent1"/>
+            </a:fillRef>
+            <a:effectRef idx="0">
+              <a:schemeClr val="accent1"/>
+            </a:effectRef>
+            <a:fontRef idx="minor">
+              <a:schemeClr val="lt1"/>
+            </a:fontRef>
+          </p:style>
+          <p:txBody>
+            <a:bodyPr rtlCol="0" anchor="ctr"/>
+            <a:lstStyle/>
+            <a:p>
+              <a:pPr algn="ctr"/>
+              <a:endParaRPr lang="en-US"/>
+            </a:p>
+          </p:txBody>
+        </p:sp>
+        <p:sp>
+          <p:nvSpPr>
+            <p:cNvPr id="9" name="Hexagon 8">
+              <a:extLst>
+                <a:ext uri="{FF2B5EF4-FFF2-40B4-BE49-F238E27FC236}">
+                  <a16:creationId xmlns:a16="http://schemas.microsoft.com/office/drawing/2014/main" id="{D8EA5ACD-60D9-0349-B43E-B1A473A8E479}"/>
+                </a:ext>
+              </a:extLst>
+            </p:cNvPr>
+            <p:cNvSpPr/>
+            <p:nvPr/>
+          </p:nvSpPr>
+          <p:spPr>
+            <a:xfrm>
+              <a:off x="3419059" y="2352259"/>
+              <a:ext cx="622853" cy="556592"/>
+            </a:xfrm>
+            <a:prstGeom prst="hexagon">
+              <a:avLst/>
+            </a:prstGeom>
+          </p:spPr>
+          <p:style>
+            <a:lnRef idx="2">
+              <a:schemeClr val="accent1">
+                <a:shade val="50000"/>
+              </a:schemeClr>
+            </a:lnRef>
+            <a:fillRef idx="1">
+              <a:schemeClr val="accent1"/>
+            </a:fillRef>
+            <a:effectRef idx="0">
+              <a:schemeClr val="accent1"/>
+            </a:effectRef>
+            <a:fontRef idx="minor">
+              <a:schemeClr val="lt1"/>
+            </a:fontRef>
+          </p:style>
+          <p:txBody>
+            <a:bodyPr rtlCol="0" anchor="ctr"/>
+            <a:lstStyle/>
+            <a:p>
+              <a:pPr algn="ctr"/>
+              <a:endParaRPr lang="en-US"/>
+            </a:p>
+          </p:txBody>
+        </p:sp>
+        <p:sp>
+          <p:nvSpPr>
+            <p:cNvPr id="10" name="Hexagon 9">
+              <a:extLst>
+                <a:ext uri="{FF2B5EF4-FFF2-40B4-BE49-F238E27FC236}">
+                  <a16:creationId xmlns:a16="http://schemas.microsoft.com/office/drawing/2014/main" id="{FA97541B-1C00-B645-8446-A8BEC6D2DCB0}"/>
+                </a:ext>
+              </a:extLst>
+            </p:cNvPr>
+            <p:cNvSpPr/>
+            <p:nvPr/>
+          </p:nvSpPr>
+          <p:spPr>
+            <a:xfrm>
+              <a:off x="4949687" y="2637182"/>
+              <a:ext cx="622853" cy="556592"/>
+            </a:xfrm>
+            <a:prstGeom prst="hexagon">
+              <a:avLst/>
+            </a:prstGeom>
+          </p:spPr>
+          <p:style>
+            <a:lnRef idx="2">
+              <a:schemeClr val="accent1">
+                <a:shade val="50000"/>
+              </a:schemeClr>
+            </a:lnRef>
+            <a:fillRef idx="1">
+              <a:schemeClr val="accent1"/>
+            </a:fillRef>
+            <a:effectRef idx="0">
+              <a:schemeClr val="accent1"/>
+            </a:effectRef>
+            <a:fontRef idx="minor">
+              <a:schemeClr val="lt1"/>
+            </a:fontRef>
+          </p:style>
+          <p:txBody>
+            <a:bodyPr rtlCol="0" anchor="ctr"/>
+            <a:lstStyle/>
+            <a:p>
+              <a:pPr algn="ctr"/>
+              <a:endParaRPr lang="en-US"/>
+            </a:p>
+          </p:txBody>
+        </p:sp>
+        <p:sp>
+          <p:nvSpPr>
+            <p:cNvPr id="11" name="Hexagon 10">
+              <a:extLst>
+                <a:ext uri="{FF2B5EF4-FFF2-40B4-BE49-F238E27FC236}">
+                  <a16:creationId xmlns:a16="http://schemas.microsoft.com/office/drawing/2014/main" id="{F169A33B-7431-6746-8A33-6CD50105CD70}"/>
+                </a:ext>
+              </a:extLst>
+            </p:cNvPr>
+            <p:cNvSpPr/>
+            <p:nvPr/>
+          </p:nvSpPr>
+          <p:spPr>
+            <a:xfrm>
+              <a:off x="3927613" y="1451111"/>
+              <a:ext cx="622853" cy="556592"/>
+            </a:xfrm>
+            <a:prstGeom prst="hexagon">
+              <a:avLst/>
+            </a:prstGeom>
+          </p:spPr>
+          <p:style>
+            <a:lnRef idx="2">
+              <a:schemeClr val="accent1">
+                <a:shade val="50000"/>
+              </a:schemeClr>
+            </a:lnRef>
+            <a:fillRef idx="1">
+              <a:schemeClr val="accent1"/>
+            </a:fillRef>
+            <a:effectRef idx="0">
+              <a:schemeClr val="accent1"/>
+            </a:effectRef>
+            <a:fontRef idx="minor">
+              <a:schemeClr val="lt1"/>
+            </a:fontRef>
+          </p:style>
+          <p:txBody>
+            <a:bodyPr rtlCol="0" anchor="ctr"/>
+            <a:lstStyle/>
+            <a:p>
+              <a:pPr algn="ctr"/>
+              <a:endParaRPr lang="en-US"/>
+            </a:p>
+          </p:txBody>
+        </p:sp>
+        <p:sp>
+          <p:nvSpPr>
+            <p:cNvPr id="12" name="Hexagon 11">
+              <a:extLst>
+                <a:ext uri="{FF2B5EF4-FFF2-40B4-BE49-F238E27FC236}">
+                  <a16:creationId xmlns:a16="http://schemas.microsoft.com/office/drawing/2014/main" id="{87FBFE03-49B0-AA4A-93F4-5036DBBD7C67}"/>
+                </a:ext>
+              </a:extLst>
+            </p:cNvPr>
+            <p:cNvSpPr/>
+            <p:nvPr/>
+          </p:nvSpPr>
+          <p:spPr>
+            <a:xfrm>
+              <a:off x="3409120" y="1762537"/>
+              <a:ext cx="622853" cy="556592"/>
+            </a:xfrm>
+            <a:prstGeom prst="hexagon">
+              <a:avLst/>
+            </a:prstGeom>
+          </p:spPr>
+          <p:style>
+            <a:lnRef idx="2">
+              <a:schemeClr val="accent1">
+                <a:shade val="50000"/>
+              </a:schemeClr>
+            </a:lnRef>
+            <a:fillRef idx="1">
+              <a:schemeClr val="accent1"/>
+            </a:fillRef>
+            <a:effectRef idx="0">
+              <a:schemeClr val="accent1"/>
+            </a:effectRef>
+            <a:fontRef idx="minor">
+              <a:schemeClr val="lt1"/>
+            </a:fontRef>
+          </p:style>
+          <p:txBody>
+            <a:bodyPr rtlCol="0" anchor="ctr"/>
+            <a:lstStyle/>
+            <a:p>
+              <a:pPr algn="ctr"/>
+              <a:endParaRPr lang="en-US"/>
+            </a:p>
+          </p:txBody>
+        </p:sp>
+        <p:sp>
+          <p:nvSpPr>
+            <p:cNvPr id="13" name="Hexagon 12">
+              <a:extLst>
+                <a:ext uri="{FF2B5EF4-FFF2-40B4-BE49-F238E27FC236}">
+                  <a16:creationId xmlns:a16="http://schemas.microsoft.com/office/drawing/2014/main" id="{3EFF086B-0255-C74D-970B-9673F375BA39}"/>
+                </a:ext>
+              </a:extLst>
+            </p:cNvPr>
+            <p:cNvSpPr/>
+            <p:nvPr/>
+          </p:nvSpPr>
+          <p:spPr>
+            <a:xfrm>
+              <a:off x="4446105" y="1755911"/>
+              <a:ext cx="622853" cy="556592"/>
+            </a:xfrm>
+            <a:prstGeom prst="hexagon">
+              <a:avLst/>
+            </a:prstGeom>
+          </p:spPr>
+          <p:style>
+            <a:lnRef idx="2">
+              <a:schemeClr val="accent1">
+                <a:shade val="50000"/>
+              </a:schemeClr>
+            </a:lnRef>
+            <a:fillRef idx="1">
+              <a:schemeClr val="accent1"/>
+            </a:fillRef>
+            <a:effectRef idx="0">
+              <a:schemeClr val="accent1"/>
+            </a:effectRef>
+            <a:fontRef idx="minor">
+              <a:schemeClr val="lt1"/>
+            </a:fontRef>
+          </p:style>
+          <p:txBody>
+            <a:bodyPr rtlCol="0" anchor="ctr"/>
+            <a:lstStyle/>
+            <a:p>
+              <a:pPr algn="ctr"/>
+              <a:endParaRPr lang="en-US"/>
+            </a:p>
+          </p:txBody>
+        </p:sp>
+        <p:sp>
+          <p:nvSpPr>
+            <p:cNvPr id="14" name="Hexagon 13">
+              <a:extLst>
+                <a:ext uri="{FF2B5EF4-FFF2-40B4-BE49-F238E27FC236}">
+                  <a16:creationId xmlns:a16="http://schemas.microsoft.com/office/drawing/2014/main" id="{0D990B9D-466C-A84B-A56D-8A6D77806C1C}"/>
+                </a:ext>
+              </a:extLst>
+            </p:cNvPr>
+            <p:cNvSpPr/>
+            <p:nvPr/>
+          </p:nvSpPr>
+          <p:spPr>
+            <a:xfrm>
+              <a:off x="4964598" y="1437859"/>
+              <a:ext cx="622853" cy="556592"/>
+            </a:xfrm>
+            <a:prstGeom prst="hexagon">
+              <a:avLst/>
+            </a:prstGeom>
+          </p:spPr>
+          <p:style>
+            <a:lnRef idx="2">
+              <a:schemeClr val="accent1">
+                <a:shade val="50000"/>
+              </a:schemeClr>
+            </a:lnRef>
+            <a:fillRef idx="1">
+              <a:schemeClr val="accent1"/>
+            </a:fillRef>
+            <a:effectRef idx="0">
+              <a:schemeClr val="accent1"/>
+            </a:effectRef>
+            <a:fontRef idx="minor">
+              <a:schemeClr val="lt1"/>
+            </a:fontRef>
+          </p:style>
+          <p:txBody>
+            <a:bodyPr rtlCol="0" anchor="ctr"/>
+            <a:lstStyle/>
+            <a:p>
+              <a:pPr algn="ctr"/>
+              <a:endParaRPr lang="en-US"/>
+            </a:p>
+          </p:txBody>
+        </p:sp>
+        <p:sp>
+          <p:nvSpPr>
+            <p:cNvPr id="15" name="Hexagon 14">
+              <a:extLst>
+                <a:ext uri="{FF2B5EF4-FFF2-40B4-BE49-F238E27FC236}">
+                  <a16:creationId xmlns:a16="http://schemas.microsoft.com/office/drawing/2014/main" id="{0EB7901D-D436-D449-AC05-AECB6E5E98DE}"/>
+                </a:ext>
+              </a:extLst>
+            </p:cNvPr>
+            <p:cNvSpPr/>
+            <p:nvPr/>
+          </p:nvSpPr>
+          <p:spPr>
+            <a:xfrm>
+              <a:off x="4446105" y="1139685"/>
+              <a:ext cx="622853" cy="556592"/>
+            </a:xfrm>
+            <a:prstGeom prst="hexagon">
+              <a:avLst/>
+            </a:prstGeom>
+          </p:spPr>
+          <p:style>
+            <a:lnRef idx="2">
+              <a:schemeClr val="accent1">
+                <a:shade val="50000"/>
+              </a:schemeClr>
+            </a:lnRef>
+            <a:fillRef idx="1">
+              <a:schemeClr val="accent1"/>
+            </a:fillRef>
+            <a:effectRef idx="0">
+              <a:schemeClr val="accent1"/>
+            </a:effectRef>
+            <a:fontRef idx="minor">
+              <a:schemeClr val="lt1"/>
+            </a:fontRef>
+          </p:style>
+          <p:txBody>
+            <a:bodyPr rtlCol="0" anchor="ctr"/>
+            <a:lstStyle/>
+            <a:p>
+              <a:pPr algn="ctr"/>
+              <a:endParaRPr lang="en-US"/>
+            </a:p>
+          </p:txBody>
+        </p:sp>
+        <p:sp>
+          <p:nvSpPr>
+            <p:cNvPr id="16" name="Hexagon 15">
+              <a:extLst>
+                <a:ext uri="{FF2B5EF4-FFF2-40B4-BE49-F238E27FC236}">
+                  <a16:creationId xmlns:a16="http://schemas.microsoft.com/office/drawing/2014/main" id="{8D40B29B-5B35-A241-B539-70FE834FB7C0}"/>
+                </a:ext>
+              </a:extLst>
+            </p:cNvPr>
+            <p:cNvSpPr/>
+            <p:nvPr/>
+          </p:nvSpPr>
+          <p:spPr>
+            <a:xfrm>
+              <a:off x="3419059" y="1172815"/>
+              <a:ext cx="622853" cy="556592"/>
+            </a:xfrm>
+            <a:prstGeom prst="hexagon">
+              <a:avLst/>
+            </a:prstGeom>
+          </p:spPr>
+          <p:style>
+            <a:lnRef idx="2">
+              <a:schemeClr val="accent1">
+                <a:shade val="50000"/>
+              </a:schemeClr>
+            </a:lnRef>
+            <a:fillRef idx="1">
+              <a:schemeClr val="accent1"/>
+            </a:fillRef>
+            <a:effectRef idx="0">
+              <a:schemeClr val="accent1"/>
+            </a:effectRef>
+            <a:fontRef idx="minor">
+              <a:schemeClr val="lt1"/>
+            </a:fontRef>
+          </p:style>
+          <p:txBody>
+            <a:bodyPr rtlCol="0" anchor="ctr"/>
+            <a:lstStyle/>
+            <a:p>
+              <a:pPr algn="ctr"/>
+              <a:endParaRPr lang="en-US"/>
+            </a:p>
+          </p:txBody>
+        </p:sp>
+      </p:grpSp>
+      <p:sp>
+        <p:nvSpPr>
+          <p:cNvPr id="18" name="TextBox 17">
+            <a:extLst>
+              <a:ext uri="{FF2B5EF4-FFF2-40B4-BE49-F238E27FC236}">
+                <a16:creationId xmlns:a16="http://schemas.microsoft.com/office/drawing/2014/main" id="{251E8BBF-1B0C-F141-BDE8-0E57934FEAA3}"/>
+              </a:ext>
+            </a:extLst>
+          </p:cNvPr>
+          <p:cNvSpPr txBox="1"/>
+          <p:nvPr/>
+        </p:nvSpPr>
+        <p:spPr>
+          <a:xfrm>
+            <a:off x="675861" y="3220278"/>
+            <a:ext cx="8844088" cy="923330"/>
+          </a:xfrm>
+          <a:prstGeom prst="rect">
+            <a:avLst/>
+          </a:prstGeom>
+          <a:noFill/>
+        </p:spPr>
+        <p:txBody>
+          <a:bodyPr wrap="none" rtlCol="0">
+            <a:spAutoFit/>
+          </a:bodyPr>
+          <a:lstStyle/>
+          <a:p>
+            <a:r>
+              <a:rPr lang="en-US" dirty="0"/>
+              <a:t>Points for exterior edge are labeled [</a:t>
+            </a:r>
+            <a:r>
+              <a:rPr lang="en-US" dirty="0" err="1"/>
+              <a:t>row,col</a:t>
+            </a:r>
+            <a:r>
+              <a:rPr lang="en-US" dirty="0"/>
+              <a:t>] starting at [0,0]:</a:t>
+            </a:r>
+          </a:p>
+          <a:p>
+            <a:r>
+              <a:rPr lang="en-US" dirty="0"/>
+              <a:t>[[0,0], [1,0], [2,0], [3,0], [4,0],[5,0], [6,0], [7,0], [8,0], [8,1], [7,1], [7,2], [8,2], [8,3], [7,3], [7,4],</a:t>
+            </a:r>
+          </a:p>
+          <a:p>
+            <a:r>
+              <a:rPr lang="en-US" dirty="0"/>
+              <a:t> [6,4], [5,4], [4,4], [3,4], [2,4], [1,4], [1,3], [0,3], [0,2], [1,2], [1,1], [0,1]]</a:t>
+            </a:r>
+          </a:p>
+        </p:txBody>
+      </p:sp>
+      <p:sp>
+        <p:nvSpPr>
+          <p:cNvPr id="19" name="TextBox 18">
+            <a:extLst>
+              <a:ext uri="{FF2B5EF4-FFF2-40B4-BE49-F238E27FC236}">
+                <a16:creationId xmlns:a16="http://schemas.microsoft.com/office/drawing/2014/main" id="{C90AC93F-DB01-F349-8A07-8FD90D5636CC}"/>
+              </a:ext>
+            </a:extLst>
+          </p:cNvPr>
+          <p:cNvSpPr txBox="1"/>
+          <p:nvPr/>
+        </p:nvSpPr>
+        <p:spPr>
+          <a:xfrm>
+            <a:off x="85511" y="250204"/>
+            <a:ext cx="617477" cy="369332"/>
+          </a:xfrm>
+          <a:prstGeom prst="rect">
+            <a:avLst/>
+          </a:prstGeom>
+          <a:noFill/>
+        </p:spPr>
+        <p:txBody>
+          <a:bodyPr wrap="none" rtlCol="0">
+            <a:spAutoFit/>
+          </a:bodyPr>
+          <a:lstStyle/>
+          <a:p>
+            <a:r>
+              <a:rPr lang="en-US" dirty="0"/>
+              <a:t>[8,0]</a:t>
+            </a:r>
+          </a:p>
+        </p:txBody>
+      </p:sp>
+      <p:sp>
+        <p:nvSpPr>
+          <p:cNvPr id="20" name="TextBox 19">
+            <a:extLst>
+              <a:ext uri="{FF2B5EF4-FFF2-40B4-BE49-F238E27FC236}">
+                <a16:creationId xmlns:a16="http://schemas.microsoft.com/office/drawing/2014/main" id="{DD1FCE22-1D75-EE4E-ABE8-49B99C3BA21F}"/>
+              </a:ext>
+            </a:extLst>
+          </p:cNvPr>
+          <p:cNvSpPr txBox="1"/>
+          <p:nvPr/>
+        </p:nvSpPr>
+        <p:spPr>
+          <a:xfrm>
+            <a:off x="2731394" y="519427"/>
+            <a:ext cx="617477" cy="369332"/>
+          </a:xfrm>
+          <a:prstGeom prst="rect">
+            <a:avLst/>
+          </a:prstGeom>
+          <a:noFill/>
+        </p:spPr>
+        <p:txBody>
+          <a:bodyPr wrap="none" rtlCol="0">
+            <a:spAutoFit/>
+          </a:bodyPr>
+          <a:lstStyle/>
+          <a:p>
+            <a:r>
+              <a:rPr lang="en-US" dirty="0"/>
+              <a:t>[7,4]</a:t>
+            </a:r>
+          </a:p>
+        </p:txBody>
+      </p:sp>
+      <p:sp>
+        <p:nvSpPr>
+          <p:cNvPr id="21" name="TextBox 20">
+            <a:extLst>
+              <a:ext uri="{FF2B5EF4-FFF2-40B4-BE49-F238E27FC236}">
+                <a16:creationId xmlns:a16="http://schemas.microsoft.com/office/drawing/2014/main" id="{D168AD75-3BBA-7C4F-95AA-B9A1E6C3BE3A}"/>
+              </a:ext>
+            </a:extLst>
+          </p:cNvPr>
+          <p:cNvSpPr txBox="1"/>
+          <p:nvPr/>
+        </p:nvSpPr>
+        <p:spPr>
+          <a:xfrm>
+            <a:off x="85511" y="2807010"/>
+            <a:ext cx="617477" cy="369332"/>
+          </a:xfrm>
+          <a:prstGeom prst="rect">
+            <a:avLst/>
+          </a:prstGeom>
+          <a:noFill/>
+        </p:spPr>
+        <p:txBody>
+          <a:bodyPr wrap="none" rtlCol="0">
+            <a:spAutoFit/>
+          </a:bodyPr>
+          <a:lstStyle/>
+          <a:p>
+            <a:r>
+              <a:rPr lang="en-US" dirty="0"/>
+              <a:t>[0,0]</a:t>
+            </a:r>
+          </a:p>
+        </p:txBody>
+      </p:sp>
+      <p:sp>
+        <p:nvSpPr>
+          <p:cNvPr id="22" name="TextBox 21">
+            <a:extLst>
+              <a:ext uri="{FF2B5EF4-FFF2-40B4-BE49-F238E27FC236}">
+                <a16:creationId xmlns:a16="http://schemas.microsoft.com/office/drawing/2014/main" id="{B0690F91-66C0-144B-B54C-2836D3B9C5F7}"/>
+              </a:ext>
+            </a:extLst>
+          </p:cNvPr>
+          <p:cNvSpPr txBox="1"/>
+          <p:nvPr/>
+        </p:nvSpPr>
+        <p:spPr>
+          <a:xfrm>
+            <a:off x="2703861" y="2373004"/>
+            <a:ext cx="617477" cy="369332"/>
+          </a:xfrm>
+          <a:prstGeom prst="rect">
+            <a:avLst/>
+          </a:prstGeom>
+          <a:noFill/>
+        </p:spPr>
+        <p:txBody>
+          <a:bodyPr wrap="none" rtlCol="0">
+            <a:spAutoFit/>
+          </a:bodyPr>
+          <a:lstStyle/>
+          <a:p>
+            <a:r>
+              <a:rPr lang="en-US" dirty="0"/>
+              <a:t>[1,4]</a:t>
+            </a:r>
+          </a:p>
+        </p:txBody>
+      </p:sp>
+      <p:sp>
+        <p:nvSpPr>
+          <p:cNvPr id="23" name="TextBox 22">
+            <a:extLst>
+              <a:ext uri="{FF2B5EF4-FFF2-40B4-BE49-F238E27FC236}">
+                <a16:creationId xmlns:a16="http://schemas.microsoft.com/office/drawing/2014/main" id="{1DA21710-A659-6B4B-B6EE-79B583297AD9}"/>
+              </a:ext>
+            </a:extLst>
+          </p:cNvPr>
+          <p:cNvSpPr txBox="1"/>
+          <p:nvPr/>
+        </p:nvSpPr>
+        <p:spPr>
+          <a:xfrm>
+            <a:off x="702988" y="4494790"/>
+            <a:ext cx="6483313" cy="646331"/>
+          </a:xfrm>
+          <a:prstGeom prst="rect">
+            <a:avLst/>
+          </a:prstGeom>
+          <a:noFill/>
+        </p:spPr>
+        <p:txBody>
+          <a:bodyPr wrap="none" rtlCol="0">
+            <a:spAutoFit/>
+          </a:bodyPr>
+          <a:lstStyle/>
+          <a:p>
+            <a:r>
+              <a:rPr lang="en-US" dirty="0"/>
+              <a:t>Hexes in the tile are listed row-by-row, starting with row 0 (bottom):</a:t>
+            </a:r>
+          </a:p>
+          <a:p>
+            <a:r>
+              <a:rPr lang="en-US" dirty="0"/>
+              <a:t>[[0,1],[0,1],[0,1],[0,1],[0,1],[0,1],[0,1]]</a:t>
+            </a:r>
+          </a:p>
+        </p:txBody>
+      </p:sp>
+    </p:spTree>
+    <p:extLst>
+      <p:ext uri="{BB962C8B-B14F-4D97-AF65-F5344CB8AC3E}">
+        <p14:creationId xmlns:p14="http://schemas.microsoft.com/office/powerpoint/2010/main" val="3599496061"/>
       </p:ext>
     </p:extLst>
   </p:cSld>

</xml_diff>